<commit_message>
Finished milestone 2 deliverables, fixed subtitle sync with 2nd implementation, updated project log
</commit_message>
<xml_diff>
--- a/Skylab documents/Milestone 2 Submission/Submission 1/Poster/poster.pptx
+++ b/Skylab documents/Milestone 2 Submission/Submission 1/Poster/poster.pptx
@@ -261,7 +261,7 @@
           <a:p>
             <a:fld id="{68DB185E-D2F1-4159-8F71-195F38FC89AA}" type="datetimeFigureOut">
               <a:rPr lang="en-SG" smtClean="0"/>
-              <a:t>24/5/2019</a:t>
+              <a:t>1/7/2019</a:t>
             </a:fld>
             <a:endParaRPr lang="en-SG"/>
           </a:p>
@@ -461,7 +461,7 @@
           <a:p>
             <a:fld id="{68DB185E-D2F1-4159-8F71-195F38FC89AA}" type="datetimeFigureOut">
               <a:rPr lang="en-SG" smtClean="0"/>
-              <a:t>24/5/2019</a:t>
+              <a:t>1/7/2019</a:t>
             </a:fld>
             <a:endParaRPr lang="en-SG"/>
           </a:p>
@@ -671,7 +671,7 @@
           <a:p>
             <a:fld id="{68DB185E-D2F1-4159-8F71-195F38FC89AA}" type="datetimeFigureOut">
               <a:rPr lang="en-SG" smtClean="0"/>
-              <a:t>24/5/2019</a:t>
+              <a:t>1/7/2019</a:t>
             </a:fld>
             <a:endParaRPr lang="en-SG"/>
           </a:p>
@@ -871,7 +871,7 @@
           <a:p>
             <a:fld id="{68DB185E-D2F1-4159-8F71-195F38FC89AA}" type="datetimeFigureOut">
               <a:rPr lang="en-SG" smtClean="0"/>
-              <a:t>24/5/2019</a:t>
+              <a:t>1/7/2019</a:t>
             </a:fld>
             <a:endParaRPr lang="en-SG"/>
           </a:p>
@@ -1147,7 +1147,7 @@
           <a:p>
             <a:fld id="{68DB185E-D2F1-4159-8F71-195F38FC89AA}" type="datetimeFigureOut">
               <a:rPr lang="en-SG" smtClean="0"/>
-              <a:t>24/5/2019</a:t>
+              <a:t>1/7/2019</a:t>
             </a:fld>
             <a:endParaRPr lang="en-SG"/>
           </a:p>
@@ -1415,7 +1415,7 @@
           <a:p>
             <a:fld id="{68DB185E-D2F1-4159-8F71-195F38FC89AA}" type="datetimeFigureOut">
               <a:rPr lang="en-SG" smtClean="0"/>
-              <a:t>24/5/2019</a:t>
+              <a:t>1/7/2019</a:t>
             </a:fld>
             <a:endParaRPr lang="en-SG"/>
           </a:p>
@@ -1830,7 +1830,7 @@
           <a:p>
             <a:fld id="{68DB185E-D2F1-4159-8F71-195F38FC89AA}" type="datetimeFigureOut">
               <a:rPr lang="en-SG" smtClean="0"/>
-              <a:t>24/5/2019</a:t>
+              <a:t>1/7/2019</a:t>
             </a:fld>
             <a:endParaRPr lang="en-SG"/>
           </a:p>
@@ -1972,7 +1972,7 @@
           <a:p>
             <a:fld id="{68DB185E-D2F1-4159-8F71-195F38FC89AA}" type="datetimeFigureOut">
               <a:rPr lang="en-SG" smtClean="0"/>
-              <a:t>24/5/2019</a:t>
+              <a:t>1/7/2019</a:t>
             </a:fld>
             <a:endParaRPr lang="en-SG"/>
           </a:p>
@@ -2085,7 +2085,7 @@
           <a:p>
             <a:fld id="{68DB185E-D2F1-4159-8F71-195F38FC89AA}" type="datetimeFigureOut">
               <a:rPr lang="en-SG" smtClean="0"/>
-              <a:t>24/5/2019</a:t>
+              <a:t>1/7/2019</a:t>
             </a:fld>
             <a:endParaRPr lang="en-SG"/>
           </a:p>
@@ -2398,7 +2398,7 @@
           <a:p>
             <a:fld id="{68DB185E-D2F1-4159-8F71-195F38FC89AA}" type="datetimeFigureOut">
               <a:rPr lang="en-SG" smtClean="0"/>
-              <a:t>24/5/2019</a:t>
+              <a:t>1/7/2019</a:t>
             </a:fld>
             <a:endParaRPr lang="en-SG"/>
           </a:p>
@@ -2687,7 +2687,7 @@
           <a:p>
             <a:fld id="{68DB185E-D2F1-4159-8F71-195F38FC89AA}" type="datetimeFigureOut">
               <a:rPr lang="en-SG" smtClean="0"/>
-              <a:t>24/5/2019</a:t>
+              <a:t>1/7/2019</a:t>
             </a:fld>
             <a:endParaRPr lang="en-SG"/>
           </a:p>
@@ -2930,7 +2930,7 @@
           <a:p>
             <a:fld id="{68DB185E-D2F1-4159-8F71-195F38FC89AA}" type="datetimeFigureOut">
               <a:rPr lang="en-SG" smtClean="0"/>
-              <a:t>24/5/2019</a:t>
+              <a:t>1/7/2019</a:t>
             </a:fld>
             <a:endParaRPr lang="en-SG"/>
           </a:p>
@@ -3349,10 +3349,10 @@
       </p:grpSpPr>
       <p:sp>
         <p:nvSpPr>
-          <p:cNvPr id="2" name="Title 1">
-            <a:extLst>
-              <a:ext uri="{FF2B5EF4-FFF2-40B4-BE49-F238E27FC236}">
-                <a16:creationId xmlns:a16="http://schemas.microsoft.com/office/drawing/2014/main" id="{BB6BDDBC-CE37-44E5-A48C-561A2DB97F11}"/>
+          <p:cNvPr id="9" name="Title 8">
+            <a:extLst>
+              <a:ext uri="{FF2B5EF4-FFF2-40B4-BE49-F238E27FC236}">
+                <a16:creationId xmlns:a16="http://schemas.microsoft.com/office/drawing/2014/main" id="{DB946DCB-6E27-4BB7-A6B2-D6D0221131A1}"/>
               </a:ext>
             </a:extLst>
           </p:cNvPr>
@@ -3365,8 +3365,8 @@
         </p:nvSpPr>
         <p:spPr>
           <a:xfrm>
-            <a:off x="838200" y="365126"/>
-            <a:ext cx="10515600" cy="1011188"/>
+            <a:off x="37708" y="-263953"/>
+            <a:ext cx="12154292" cy="1325563"/>
           </a:xfrm>
         </p:spPr>
         <p:txBody>
@@ -3379,148 +3379,17 @@
             </a:r>
             <a:r>
               <a:rPr lang="en-SG" dirty="0"/>
-              <a:t> Plus</a:t>
-            </a:r>
-          </a:p>
-        </p:txBody>
-      </p:sp>
-      <p:sp>
-        <p:nvSpPr>
-          <p:cNvPr id="3" name="Content Placeholder 2">
-            <a:extLst>
-              <a:ext uri="{FF2B5EF4-FFF2-40B4-BE49-F238E27FC236}">
-                <a16:creationId xmlns:a16="http://schemas.microsoft.com/office/drawing/2014/main" id="{2E0B6EE2-4D2E-4CEF-ACEC-76606DDFEF99}"/>
-              </a:ext>
-            </a:extLst>
-          </p:cNvPr>
-          <p:cNvSpPr>
-            <a:spLocks noGrp="1"/>
-          </p:cNvSpPr>
-          <p:nvPr>
-            <p:ph idx="1"/>
-          </p:nvPr>
-        </p:nvSpPr>
-        <p:spPr>
-          <a:xfrm>
-            <a:off x="226243" y="1703895"/>
-            <a:ext cx="5685148" cy="4351338"/>
-          </a:xfrm>
-        </p:spPr>
-        <p:txBody>
-          <a:bodyPr>
-            <a:normAutofit/>
-          </a:bodyPr>
-          <a:lstStyle/>
-          <a:p>
-            <a:pPr marL="0" indent="0">
-              <a:buNone/>
-            </a:pPr>
-            <a:r>
-              <a:rPr lang="en-US" dirty="0">
-                <a:solidFill>
-                  <a:schemeClr val="accent1"/>
-                </a:solidFill>
-              </a:rPr>
-              <a:t>Chrome extension</a:t>
-            </a:r>
-            <a:r>
-              <a:rPr lang="en-US" dirty="0"/>
-              <a:t> to improve the user experience of webcasting</a:t>
-            </a:r>
-          </a:p>
-          <a:p>
-            <a:pPr marL="0" indent="0">
-              <a:buNone/>
-            </a:pPr>
-            <a:r>
-              <a:rPr lang="en-US" dirty="0"/>
-              <a:t>Key Features:</a:t>
-            </a:r>
-          </a:p>
-          <a:p>
-            <a:pPr lvl="1"/>
-            <a:r>
-              <a:rPr lang="en-US" dirty="0"/>
-              <a:t>Improved user interface</a:t>
-            </a:r>
-          </a:p>
-          <a:p>
-            <a:pPr lvl="2"/>
-            <a:r>
-              <a:rPr lang="en-US" dirty="0"/>
-              <a:t>Faster playback speed options, persistent user settings </a:t>
-            </a:r>
-            <a:r>
-              <a:rPr lang="en-US" dirty="0" err="1"/>
-              <a:t>etc</a:t>
-            </a:r>
-            <a:endParaRPr lang="en-US" dirty="0"/>
-          </a:p>
-          <a:p>
-            <a:pPr lvl="1"/>
-            <a:r>
-              <a:rPr lang="en-US" dirty="0"/>
-              <a:t>Subtitles &amp; Transcript</a:t>
-            </a:r>
-          </a:p>
-          <a:p>
-            <a:pPr lvl="1"/>
-            <a:r>
-              <a:rPr lang="en-US" dirty="0"/>
-              <a:t>Auto removal of silent sections in the webcast</a:t>
-            </a:r>
-          </a:p>
-        </p:txBody>
-      </p:sp>
-      <p:sp>
-        <p:nvSpPr>
-          <p:cNvPr id="4" name="TextBox 3">
-            <a:extLst>
-              <a:ext uri="{FF2B5EF4-FFF2-40B4-BE49-F238E27FC236}">
-                <a16:creationId xmlns:a16="http://schemas.microsoft.com/office/drawing/2014/main" id="{EEFF9366-A410-4B34-91D3-CACA53A32C99}"/>
-              </a:ext>
-            </a:extLst>
-          </p:cNvPr>
-          <p:cNvSpPr txBox="1"/>
-          <p:nvPr/>
-        </p:nvSpPr>
-        <p:spPr>
-          <a:xfrm>
-            <a:off x="8737336" y="6441608"/>
-            <a:ext cx="3454664" cy="369332"/>
-          </a:xfrm>
-          <a:prstGeom prst="rect">
-            <a:avLst/>
-          </a:prstGeom>
-          <a:noFill/>
-        </p:spPr>
-        <p:txBody>
-          <a:bodyPr wrap="none" rtlCol="0">
-            <a:spAutoFit/>
-          </a:bodyPr>
-          <a:lstStyle/>
-          <a:p>
-            <a:r>
-              <a:rPr lang="en-SG" dirty="0"/>
-              <a:t>Group 1: Matthew Lee &amp; </a:t>
-            </a:r>
-            <a:r>
-              <a:rPr lang="en-SG" dirty="0" err="1"/>
-              <a:t>Fyonn</a:t>
-            </a:r>
-            <a:r>
-              <a:rPr lang="en-SG" dirty="0"/>
-              <a:t> Oh</a:t>
+              <a:t> Plus (Features thus far)</a:t>
             </a:r>
           </a:p>
         </p:txBody>
       </p:sp>
       <p:pic>
         <p:nvPicPr>
-          <p:cNvPr id="6" name="Picture 5">
-            <a:extLst>
-              <a:ext uri="{FF2B5EF4-FFF2-40B4-BE49-F238E27FC236}">
-                <a16:creationId xmlns:a16="http://schemas.microsoft.com/office/drawing/2014/main" id="{6A309F5E-B559-484C-A09D-FA00A474E0AB}"/>
+          <p:cNvPr id="15" name="Picture 14">
+            <a:extLst>
+              <a:ext uri="{FF2B5EF4-FFF2-40B4-BE49-F238E27FC236}">
+                <a16:creationId xmlns:a16="http://schemas.microsoft.com/office/drawing/2014/main" id="{842A7DD5-8825-4FF1-BBB3-40108620DF12}"/>
               </a:ext>
             </a:extLst>
           </p:cNvPr>
@@ -3537,14 +3406,594 @@
         </p:blipFill>
         <p:spPr>
           <a:xfrm>
-            <a:off x="6645897" y="1703895"/>
-            <a:ext cx="5319860" cy="2992421"/>
+            <a:off x="734125" y="1027471"/>
+            <a:ext cx="8538770" cy="4803058"/>
           </a:xfrm>
           <a:prstGeom prst="rect">
             <a:avLst/>
           </a:prstGeom>
         </p:spPr>
       </p:pic>
+      <p:sp>
+        <p:nvSpPr>
+          <p:cNvPr id="18" name="Callout: Bent Line with No Border 17">
+            <a:extLst>
+              <a:ext uri="{FF2B5EF4-FFF2-40B4-BE49-F238E27FC236}">
+                <a16:creationId xmlns:a16="http://schemas.microsoft.com/office/drawing/2014/main" id="{B50405B9-0B6B-42EF-B168-200090FBEDAD}"/>
+              </a:ext>
+            </a:extLst>
+          </p:cNvPr>
+          <p:cNvSpPr/>
+          <p:nvPr/>
+        </p:nvSpPr>
+        <p:spPr>
+          <a:xfrm>
+            <a:off x="9642710" y="3138676"/>
+            <a:ext cx="1815163" cy="1130710"/>
+          </a:xfrm>
+          <a:prstGeom prst="callout2">
+            <a:avLst>
+              <a:gd name="adj1" fmla="val 18750"/>
+              <a:gd name="adj2" fmla="val -8333"/>
+              <a:gd name="adj3" fmla="val 18750"/>
+              <a:gd name="adj4" fmla="val -16667"/>
+              <a:gd name="adj5" fmla="val 138587"/>
+              <a:gd name="adj6" fmla="val -99751"/>
+            </a:avLst>
+          </a:prstGeom>
+          <a:solidFill>
+            <a:schemeClr val="accent5"/>
+          </a:solidFill>
+          <a:ln>
+            <a:solidFill>
+              <a:schemeClr val="accent5"/>
+            </a:solidFill>
+          </a:ln>
+        </p:spPr>
+        <p:style>
+          <a:lnRef idx="3">
+            <a:schemeClr val="lt1"/>
+          </a:lnRef>
+          <a:fillRef idx="1">
+            <a:schemeClr val="accent5"/>
+          </a:fillRef>
+          <a:effectRef idx="1">
+            <a:schemeClr val="accent5"/>
+          </a:effectRef>
+          <a:fontRef idx="minor">
+            <a:schemeClr val="lt1"/>
+          </a:fontRef>
+        </p:style>
+        <p:txBody>
+          <a:bodyPr rtlCol="0" anchor="ctr"/>
+          <a:lstStyle/>
+          <a:p>
+            <a:pPr algn="ctr"/>
+            <a:r>
+              <a:rPr lang="en-SG" dirty="0"/>
+              <a:t>Subtitles</a:t>
+            </a:r>
+          </a:p>
+          <a:p>
+            <a:pPr algn="ctr"/>
+            <a:r>
+              <a:rPr lang="en-SG" dirty="0"/>
+              <a:t>(synced on both video streams)</a:t>
+            </a:r>
+          </a:p>
+        </p:txBody>
+      </p:sp>
+      <p:sp>
+        <p:nvSpPr>
+          <p:cNvPr id="26" name="Callout: Bent Line with No Border 25">
+            <a:extLst>
+              <a:ext uri="{FF2B5EF4-FFF2-40B4-BE49-F238E27FC236}">
+                <a16:creationId xmlns:a16="http://schemas.microsoft.com/office/drawing/2014/main" id="{ED61A45D-6198-4E87-9A70-31CE7ADA5894}"/>
+              </a:ext>
+            </a:extLst>
+          </p:cNvPr>
+          <p:cNvSpPr/>
+          <p:nvPr/>
+        </p:nvSpPr>
+        <p:spPr>
+          <a:xfrm>
+            <a:off x="9642711" y="5166854"/>
+            <a:ext cx="1815163" cy="742335"/>
+          </a:xfrm>
+          <a:prstGeom prst="callout2">
+            <a:avLst>
+              <a:gd name="adj1" fmla="val 18750"/>
+              <a:gd name="adj2" fmla="val -8333"/>
+              <a:gd name="adj3" fmla="val 18750"/>
+              <a:gd name="adj4" fmla="val -16667"/>
+              <a:gd name="adj5" fmla="val 68861"/>
+              <a:gd name="adj6" fmla="val -39083"/>
+            </a:avLst>
+          </a:prstGeom>
+          <a:solidFill>
+            <a:schemeClr val="accent5"/>
+          </a:solidFill>
+          <a:ln w="19050">
+            <a:solidFill>
+              <a:schemeClr val="accent5"/>
+            </a:solidFill>
+          </a:ln>
+        </p:spPr>
+        <p:style>
+          <a:lnRef idx="3">
+            <a:schemeClr val="lt1"/>
+          </a:lnRef>
+          <a:fillRef idx="1">
+            <a:schemeClr val="accent5"/>
+          </a:fillRef>
+          <a:effectRef idx="1">
+            <a:schemeClr val="accent5"/>
+          </a:effectRef>
+          <a:fontRef idx="minor">
+            <a:schemeClr val="lt1"/>
+          </a:fontRef>
+        </p:style>
+        <p:txBody>
+          <a:bodyPr rtlCol="0" anchor="ctr"/>
+          <a:lstStyle/>
+          <a:p>
+            <a:pPr algn="ctr"/>
+            <a:r>
+              <a:rPr lang="en-SG" dirty="0"/>
+              <a:t>Smaller Carousel</a:t>
+            </a:r>
+          </a:p>
+        </p:txBody>
+      </p:sp>
+      <p:sp>
+        <p:nvSpPr>
+          <p:cNvPr id="27" name="Callout: Bent Line with No Border 26">
+            <a:extLst>
+              <a:ext uri="{FF2B5EF4-FFF2-40B4-BE49-F238E27FC236}">
+                <a16:creationId xmlns:a16="http://schemas.microsoft.com/office/drawing/2014/main" id="{FB2DD5FB-B26F-4F7A-BE20-F5EC144BBA51}"/>
+              </a:ext>
+            </a:extLst>
+          </p:cNvPr>
+          <p:cNvSpPr/>
+          <p:nvPr/>
+        </p:nvSpPr>
+        <p:spPr>
+          <a:xfrm>
+            <a:off x="9642711" y="1514168"/>
+            <a:ext cx="1815163" cy="1467464"/>
+          </a:xfrm>
+          <a:prstGeom prst="callout2">
+            <a:avLst>
+              <a:gd name="adj1" fmla="val 18750"/>
+              <a:gd name="adj2" fmla="val -8333"/>
+              <a:gd name="adj3" fmla="val 18750"/>
+              <a:gd name="adj4" fmla="val -16667"/>
+              <a:gd name="adj5" fmla="val 84360"/>
+              <a:gd name="adj6" fmla="val -73750"/>
+            </a:avLst>
+          </a:prstGeom>
+          <a:solidFill>
+            <a:schemeClr val="accent5"/>
+          </a:solidFill>
+          <a:ln>
+            <a:solidFill>
+              <a:schemeClr val="accent5"/>
+            </a:solidFill>
+          </a:ln>
+        </p:spPr>
+        <p:style>
+          <a:lnRef idx="3">
+            <a:schemeClr val="lt1"/>
+          </a:lnRef>
+          <a:fillRef idx="1">
+            <a:schemeClr val="accent5"/>
+          </a:fillRef>
+          <a:effectRef idx="1">
+            <a:schemeClr val="accent5"/>
+          </a:effectRef>
+          <a:fontRef idx="minor">
+            <a:schemeClr val="lt1"/>
+          </a:fontRef>
+        </p:style>
+        <p:txBody>
+          <a:bodyPr rtlCol="0" anchor="ctr"/>
+          <a:lstStyle/>
+          <a:p>
+            <a:pPr algn="ctr"/>
+            <a:r>
+              <a:rPr lang="en-SG" dirty="0"/>
+              <a:t>Silence Trimming</a:t>
+            </a:r>
+          </a:p>
+          <a:p>
+            <a:pPr algn="ctr"/>
+            <a:r>
+              <a:rPr lang="en-SG" dirty="0"/>
+              <a:t>(Automated removal of non speaking sections)</a:t>
+            </a:r>
+          </a:p>
+        </p:txBody>
+      </p:sp>
+      <p:sp>
+        <p:nvSpPr>
+          <p:cNvPr id="28" name="Callout: Bent Line with No Border 27">
+            <a:extLst>
+              <a:ext uri="{FF2B5EF4-FFF2-40B4-BE49-F238E27FC236}">
+                <a16:creationId xmlns:a16="http://schemas.microsoft.com/office/drawing/2014/main" id="{6000CB7F-42CA-48F9-8967-2AC1C2165200}"/>
+              </a:ext>
+            </a:extLst>
+          </p:cNvPr>
+          <p:cNvSpPr/>
+          <p:nvPr/>
+        </p:nvSpPr>
+        <p:spPr>
+          <a:xfrm>
+            <a:off x="9642709" y="4435032"/>
+            <a:ext cx="1815163" cy="579420"/>
+          </a:xfrm>
+          <a:prstGeom prst="callout2">
+            <a:avLst>
+              <a:gd name="adj1" fmla="val 18750"/>
+              <a:gd name="adj2" fmla="val -8333"/>
+              <a:gd name="adj3" fmla="val 18750"/>
+              <a:gd name="adj4" fmla="val -16667"/>
+              <a:gd name="adj5" fmla="val 153226"/>
+              <a:gd name="adj6" fmla="val -67251"/>
+            </a:avLst>
+          </a:prstGeom>
+          <a:solidFill>
+            <a:schemeClr val="accent5"/>
+          </a:solidFill>
+          <a:ln>
+            <a:solidFill>
+              <a:schemeClr val="accent5"/>
+            </a:solidFill>
+          </a:ln>
+        </p:spPr>
+        <p:style>
+          <a:lnRef idx="3">
+            <a:schemeClr val="lt1"/>
+          </a:lnRef>
+          <a:fillRef idx="1">
+            <a:schemeClr val="accent5"/>
+          </a:fillRef>
+          <a:effectRef idx="1">
+            <a:schemeClr val="accent5"/>
+          </a:effectRef>
+          <a:fontRef idx="minor">
+            <a:schemeClr val="lt1"/>
+          </a:fontRef>
+        </p:style>
+        <p:txBody>
+          <a:bodyPr rtlCol="0" anchor="ctr"/>
+          <a:lstStyle/>
+          <a:p>
+            <a:pPr algn="ctr"/>
+            <a:r>
+              <a:rPr lang="en-SG" dirty="0"/>
+              <a:t>Playback speed slider</a:t>
+            </a:r>
+          </a:p>
+        </p:txBody>
+      </p:sp>
+      <p:sp>
+        <p:nvSpPr>
+          <p:cNvPr id="29" name="Callout: Bent Line with No Border 28">
+            <a:extLst>
+              <a:ext uri="{FF2B5EF4-FFF2-40B4-BE49-F238E27FC236}">
+                <a16:creationId xmlns:a16="http://schemas.microsoft.com/office/drawing/2014/main" id="{61E23479-AC48-4898-A7E8-BEC2360A1E07}"/>
+              </a:ext>
+            </a:extLst>
+          </p:cNvPr>
+          <p:cNvSpPr/>
+          <p:nvPr/>
+        </p:nvSpPr>
+        <p:spPr>
+          <a:xfrm>
+            <a:off x="9654163" y="228326"/>
+            <a:ext cx="1815163" cy="1130710"/>
+          </a:xfrm>
+          <a:prstGeom prst="callout2">
+            <a:avLst>
+              <a:gd name="adj1" fmla="val 52663"/>
+              <a:gd name="adj2" fmla="val -8333"/>
+              <a:gd name="adj3" fmla="val 52169"/>
+              <a:gd name="adj4" fmla="val -301045"/>
+              <a:gd name="adj5" fmla="val 108596"/>
+              <a:gd name="adj6" fmla="val -343504"/>
+            </a:avLst>
+          </a:prstGeom>
+          <a:solidFill>
+            <a:schemeClr val="accent5"/>
+          </a:solidFill>
+          <a:ln w="19050">
+            <a:solidFill>
+              <a:schemeClr val="accent5"/>
+            </a:solidFill>
+          </a:ln>
+        </p:spPr>
+        <p:style>
+          <a:lnRef idx="3">
+            <a:schemeClr val="lt1"/>
+          </a:lnRef>
+          <a:fillRef idx="1">
+            <a:schemeClr val="accent5"/>
+          </a:fillRef>
+          <a:effectRef idx="1">
+            <a:schemeClr val="accent5"/>
+          </a:effectRef>
+          <a:fontRef idx="minor">
+            <a:schemeClr val="lt1"/>
+          </a:fontRef>
+        </p:style>
+        <p:txBody>
+          <a:bodyPr rtlCol="0" anchor="ctr"/>
+          <a:lstStyle/>
+          <a:p>
+            <a:pPr algn="ctr"/>
+            <a:r>
+              <a:rPr lang="en-SG" dirty="0"/>
+              <a:t>Sidebar navbar to tab between screen, transcript and settings</a:t>
+            </a:r>
+          </a:p>
+        </p:txBody>
+      </p:sp>
+      <p:sp>
+        <p:nvSpPr>
+          <p:cNvPr id="32" name="Title 8">
+            <a:extLst>
+              <a:ext uri="{FF2B5EF4-FFF2-40B4-BE49-F238E27FC236}">
+                <a16:creationId xmlns:a16="http://schemas.microsoft.com/office/drawing/2014/main" id="{2E83498E-E422-49D5-ACF1-23BF2A5DA97B}"/>
+              </a:ext>
+            </a:extLst>
+          </p:cNvPr>
+          <p:cNvSpPr txBox="1">
+            <a:spLocks/>
+          </p:cNvSpPr>
+          <p:nvPr/>
+        </p:nvSpPr>
+        <p:spPr>
+          <a:xfrm>
+            <a:off x="7084142" y="6467852"/>
+            <a:ext cx="5107858" cy="387012"/>
+          </a:xfrm>
+          <a:prstGeom prst="rect">
+            <a:avLst/>
+          </a:prstGeom>
+        </p:spPr>
+        <p:txBody>
+          <a:bodyPr vert="horz" lIns="91440" tIns="45720" rIns="91440" bIns="45720" rtlCol="0" anchor="ctr">
+            <a:normAutofit fontScale="32500" lnSpcReduction="20000"/>
+          </a:bodyPr>
+          <a:lstStyle>
+            <a:lvl1pPr algn="l" defTabSz="914400" rtl="0" eaLnBrk="1" latinLnBrk="0" hangingPunct="1">
+              <a:lnSpc>
+                <a:spcPct val="90000"/>
+              </a:lnSpc>
+              <a:spcBef>
+                <a:spcPct val="0"/>
+              </a:spcBef>
+              <a:buNone/>
+              <a:defRPr sz="4400" kern="1200">
+                <a:solidFill>
+                  <a:schemeClr val="tx1"/>
+                </a:solidFill>
+                <a:latin typeface="+mj-lt"/>
+                <a:ea typeface="+mj-ea"/>
+                <a:cs typeface="+mj-cs"/>
+              </a:defRPr>
+            </a:lvl1pPr>
+          </a:lstStyle>
+          <a:p>
+            <a:pPr algn="r"/>
+            <a:r>
+              <a:rPr lang="en-SG" dirty="0"/>
+              <a:t>Milestone 2 Submission By Group 1 Matthew &amp; </a:t>
+            </a:r>
+            <a:r>
+              <a:rPr lang="en-SG" dirty="0" err="1"/>
+              <a:t>Fyonn</a:t>
+            </a:r>
+            <a:endParaRPr lang="en-SG" dirty="0"/>
+          </a:p>
+        </p:txBody>
+      </p:sp>
+      <p:sp>
+        <p:nvSpPr>
+          <p:cNvPr id="34" name="Callout: Bent Line with No Border 33">
+            <a:extLst>
+              <a:ext uri="{FF2B5EF4-FFF2-40B4-BE49-F238E27FC236}">
+                <a16:creationId xmlns:a16="http://schemas.microsoft.com/office/drawing/2014/main" id="{127446A3-C61C-4035-AB96-E152755D90D0}"/>
+              </a:ext>
+            </a:extLst>
+          </p:cNvPr>
+          <p:cNvSpPr/>
+          <p:nvPr/>
+        </p:nvSpPr>
+        <p:spPr>
+          <a:xfrm>
+            <a:off x="9638071" y="3131576"/>
+            <a:ext cx="1815163" cy="1130710"/>
+          </a:xfrm>
+          <a:prstGeom prst="callout2">
+            <a:avLst>
+              <a:gd name="adj1" fmla="val 5707"/>
+              <a:gd name="adj2" fmla="val -8333"/>
+              <a:gd name="adj3" fmla="val 8315"/>
+              <a:gd name="adj4" fmla="val -326504"/>
+              <a:gd name="adj5" fmla="val 51630"/>
+              <a:gd name="adj6" fmla="val -361921"/>
+            </a:avLst>
+          </a:prstGeom>
+          <a:solidFill>
+            <a:schemeClr val="accent5"/>
+          </a:solidFill>
+          <a:ln>
+            <a:solidFill>
+              <a:schemeClr val="accent5"/>
+            </a:solidFill>
+          </a:ln>
+        </p:spPr>
+        <p:style>
+          <a:lnRef idx="3">
+            <a:schemeClr val="lt1"/>
+          </a:lnRef>
+          <a:fillRef idx="1">
+            <a:schemeClr val="accent5"/>
+          </a:fillRef>
+          <a:effectRef idx="1">
+            <a:schemeClr val="accent5"/>
+          </a:effectRef>
+          <a:fontRef idx="minor">
+            <a:schemeClr val="lt1"/>
+          </a:fontRef>
+        </p:style>
+        <p:txBody>
+          <a:bodyPr rtlCol="0" anchor="ctr"/>
+          <a:lstStyle/>
+          <a:p>
+            <a:pPr algn="ctr"/>
+            <a:r>
+              <a:rPr lang="en-SG" dirty="0"/>
+              <a:t>Subtitles</a:t>
+            </a:r>
+          </a:p>
+          <a:p>
+            <a:pPr algn="ctr"/>
+            <a:r>
+              <a:rPr lang="en-SG" dirty="0"/>
+              <a:t>(synced on both video streams)</a:t>
+            </a:r>
+          </a:p>
+        </p:txBody>
+      </p:sp>
+      <p:sp>
+        <p:nvSpPr>
+          <p:cNvPr id="35" name="Title 8">
+            <a:extLst>
+              <a:ext uri="{FF2B5EF4-FFF2-40B4-BE49-F238E27FC236}">
+                <a16:creationId xmlns:a16="http://schemas.microsoft.com/office/drawing/2014/main" id="{67E1CE09-8C7E-4EDB-A8C0-3BEDA55BAFA9}"/>
+              </a:ext>
+            </a:extLst>
+          </p:cNvPr>
+          <p:cNvSpPr txBox="1">
+            <a:spLocks/>
+          </p:cNvSpPr>
+          <p:nvPr/>
+        </p:nvSpPr>
+        <p:spPr>
+          <a:xfrm>
+            <a:off x="37708" y="5166854"/>
+            <a:ext cx="5107858" cy="1691146"/>
+          </a:xfrm>
+          <a:prstGeom prst="rect">
+            <a:avLst/>
+          </a:prstGeom>
+        </p:spPr>
+        <p:txBody>
+          <a:bodyPr vert="horz" lIns="91440" tIns="45720" rIns="91440" bIns="45720" rtlCol="0" anchor="t">
+            <a:normAutofit/>
+          </a:bodyPr>
+          <a:lstStyle>
+            <a:lvl1pPr algn="l" defTabSz="914400" rtl="0" eaLnBrk="1" latinLnBrk="0" hangingPunct="1">
+              <a:lnSpc>
+                <a:spcPct val="90000"/>
+              </a:lnSpc>
+              <a:spcBef>
+                <a:spcPct val="0"/>
+              </a:spcBef>
+              <a:buNone/>
+              <a:defRPr sz="4400" kern="1200">
+                <a:solidFill>
+                  <a:schemeClr val="tx1"/>
+                </a:solidFill>
+                <a:latin typeface="+mj-lt"/>
+                <a:ea typeface="+mj-ea"/>
+                <a:cs typeface="+mj-cs"/>
+              </a:defRPr>
+            </a:lvl1pPr>
+          </a:lstStyle>
+          <a:p>
+            <a:r>
+              <a:rPr lang="en-SG" sz="1400" dirty="0"/>
+              <a:t>Stay tuned for more upcoming features:</a:t>
+            </a:r>
+          </a:p>
+          <a:p>
+            <a:pPr marL="285750" indent="-285750">
+              <a:buFont typeface="Arial" panose="020B0604020202020204" pitchFamily="34" charset="0"/>
+              <a:buChar char="•"/>
+            </a:pPr>
+            <a:r>
+              <a:rPr lang="en-SG" sz="1400" dirty="0"/>
+              <a:t>Volume Booster </a:t>
+            </a:r>
+          </a:p>
+          <a:p>
+            <a:pPr marL="742950" lvl="1" indent="-285750">
+              <a:buFont typeface="Arial" panose="020B0604020202020204" pitchFamily="34" charset="0"/>
+              <a:buChar char="•"/>
+            </a:pPr>
+            <a:r>
+              <a:rPr lang="en-SG" sz="1200" dirty="0"/>
+              <a:t>(Increase volume beyond maximum)</a:t>
+            </a:r>
+          </a:p>
+          <a:p>
+            <a:pPr marL="285750" indent="-285750">
+              <a:buFont typeface="Arial" panose="020B0604020202020204" pitchFamily="34" charset="0"/>
+              <a:buChar char="•"/>
+            </a:pPr>
+            <a:r>
+              <a:rPr lang="en-SG" sz="1400" dirty="0"/>
+              <a:t>Retractable sidebar</a:t>
+            </a:r>
+          </a:p>
+          <a:p>
+            <a:pPr marL="285750" indent="-285750">
+              <a:buFont typeface="Arial" panose="020B0604020202020204" pitchFamily="34" charset="0"/>
+              <a:buChar char="•"/>
+            </a:pPr>
+            <a:r>
+              <a:rPr lang="en-SG" sz="1400" dirty="0"/>
+              <a:t>Transcript (stand-alone sidebar &amp; below screen)</a:t>
+            </a:r>
+          </a:p>
+          <a:p>
+            <a:pPr marL="285750" indent="-285750">
+              <a:buFont typeface="Arial" panose="020B0604020202020204" pitchFamily="34" charset="0"/>
+              <a:buChar char="•"/>
+            </a:pPr>
+            <a:r>
+              <a:rPr lang="en-SG" sz="1400" dirty="0"/>
+              <a:t>Finished Settings tab</a:t>
+            </a:r>
+          </a:p>
+          <a:p>
+            <a:pPr marL="285750" indent="-285750">
+              <a:buFont typeface="Arial" panose="020B0604020202020204" pitchFamily="34" charset="0"/>
+              <a:buChar char="•"/>
+            </a:pPr>
+            <a:r>
+              <a:rPr lang="en-SG" sz="1200" dirty="0"/>
+              <a:t>Customizable carousel</a:t>
+            </a:r>
+          </a:p>
+          <a:p>
+            <a:pPr marL="285750" indent="-285750">
+              <a:buFont typeface="Arial" panose="020B0604020202020204" pitchFamily="34" charset="0"/>
+              <a:buChar char="•"/>
+            </a:pPr>
+            <a:r>
+              <a:rPr lang="en-SG" sz="1200" dirty="0"/>
+              <a:t>Responsiveness (still able to watch webcast with browser minimized)</a:t>
+            </a:r>
+          </a:p>
+          <a:p>
+            <a:endParaRPr lang="en-SG" sz="1400" dirty="0"/>
+          </a:p>
+        </p:txBody>
+      </p:sp>
     </p:spTree>
     <p:extLst>
       <p:ext uri="{BB962C8B-B14F-4D97-AF65-F5344CB8AC3E}">

</xml_diff>